<commit_message>
Loop for XML parser
</commit_message>
<xml_diff>
--- a/15_Ch11_ParseXML.pptx
+++ b/15_Ch11_ParseXML.pptx
@@ -218,7 +218,7 @@
             <a:fld id="{6837EDA8-41C8-4B24-A206-13C08A65A6D7}" type="datetimeFigureOut">
               <a:rPr lang="zh-TW" altLang="en-US" smtClean="0"/>
               <a:pPr/>
-              <a:t>2018/12/13</a:t>
+              <a:t>2018/12/14</a:t>
             </a:fld>
             <a:endParaRPr lang="zh-TW" altLang="en-US"/>
           </a:p>
@@ -671,7 +671,7 @@
             <a:fld id="{8B85509C-BD4F-47BF-9B1E-FC2E949B3621}" type="datetime1">
               <a:rPr lang="zh-TW" altLang="en-US" smtClean="0"/>
               <a:pPr/>
-              <a:t>2018/12/13</a:t>
+              <a:t>2018/12/14</a:t>
             </a:fld>
             <a:endParaRPr lang="zh-TW" altLang="en-US"/>
           </a:p>
@@ -844,7 +844,7 @@
             <a:fld id="{42251B24-F787-4C15-8A0F-7AEC20C70069}" type="datetime1">
               <a:rPr lang="zh-TW" altLang="en-US" smtClean="0"/>
               <a:pPr/>
-              <a:t>2018/12/13</a:t>
+              <a:t>2018/12/14</a:t>
             </a:fld>
             <a:endParaRPr lang="zh-TW" altLang="en-US"/>
           </a:p>
@@ -1019,7 +1019,7 @@
             <a:fld id="{9CA0D33C-CE2B-45F1-B8D4-FFD1F131F331}" type="datetime1">
               <a:rPr lang="zh-TW" altLang="en-US" smtClean="0"/>
               <a:pPr/>
-              <a:t>2018/12/13</a:t>
+              <a:t>2018/12/14</a:t>
             </a:fld>
             <a:endParaRPr lang="zh-TW" altLang="en-US"/>
           </a:p>
@@ -1184,7 +1184,7 @@
             <a:fld id="{50B99440-D9EF-40CC-9B52-F6428D9B2C76}" type="datetime1">
               <a:rPr lang="zh-TW" altLang="en-US" smtClean="0"/>
               <a:pPr/>
-              <a:t>2018/12/13</a:t>
+              <a:t>2018/12/14</a:t>
             </a:fld>
             <a:endParaRPr lang="zh-TW" altLang="en-US"/>
           </a:p>
@@ -1426,7 +1426,7 @@
             <a:fld id="{0871BF52-5C6C-4959-8E27-CECB68D39FE4}" type="datetime1">
               <a:rPr lang="zh-TW" altLang="en-US" smtClean="0"/>
               <a:pPr/>
-              <a:t>2018/12/13</a:t>
+              <a:t>2018/12/14</a:t>
             </a:fld>
             <a:endParaRPr lang="zh-TW" altLang="en-US"/>
           </a:p>
@@ -1708,7 +1708,7 @@
             <a:fld id="{DF863F05-2DD9-4EB1-A827-12FD992DE9DC}" type="datetime1">
               <a:rPr lang="zh-TW" altLang="en-US" smtClean="0"/>
               <a:pPr/>
-              <a:t>2018/12/13</a:t>
+              <a:t>2018/12/14</a:t>
             </a:fld>
             <a:endParaRPr lang="zh-TW" altLang="en-US"/>
           </a:p>
@@ -2124,7 +2124,7 @@
             <a:fld id="{6339AF51-4491-4873-A096-75DB6CE47516}" type="datetime1">
               <a:rPr lang="zh-TW" altLang="en-US" smtClean="0"/>
               <a:pPr/>
-              <a:t>2018/12/13</a:t>
+              <a:t>2018/12/14</a:t>
             </a:fld>
             <a:endParaRPr lang="zh-TW" altLang="en-US"/>
           </a:p>
@@ -2238,7 +2238,7 @@
             <a:fld id="{EE4AD9C8-8B9E-40FF-ABE2-858AC2057BBB}" type="datetime1">
               <a:rPr lang="zh-TW" altLang="en-US" smtClean="0"/>
               <a:pPr/>
-              <a:t>2018/12/13</a:t>
+              <a:t>2018/12/14</a:t>
             </a:fld>
             <a:endParaRPr lang="zh-TW" altLang="en-US"/>
           </a:p>
@@ -2330,7 +2330,7 @@
             <a:fld id="{B4784999-BBBE-4BE4-A8D0-877E7D1D66CC}" type="datetime1">
               <a:rPr lang="zh-TW" altLang="en-US" smtClean="0"/>
               <a:pPr/>
-              <a:t>2018/12/13</a:t>
+              <a:t>2018/12/14</a:t>
             </a:fld>
             <a:endParaRPr lang="zh-TW" altLang="en-US"/>
           </a:p>
@@ -2602,7 +2602,7 @@
             <a:fld id="{E88D17E6-02BD-4944-B9FE-7BFCCBF83D48}" type="datetime1">
               <a:rPr lang="zh-TW" altLang="en-US" smtClean="0"/>
               <a:pPr/>
-              <a:t>2018/12/13</a:t>
+              <a:t>2018/12/14</a:t>
             </a:fld>
             <a:endParaRPr lang="zh-TW" altLang="en-US"/>
           </a:p>
@@ -2851,7 +2851,7 @@
             <a:fld id="{3C13E23D-1FEF-4D78-A3A3-3D6F2BB31954}" type="datetime1">
               <a:rPr lang="zh-TW" altLang="en-US" smtClean="0"/>
               <a:pPr/>
-              <a:t>2018/12/13</a:t>
+              <a:t>2018/12/14</a:t>
             </a:fld>
             <a:endParaRPr lang="zh-TW" altLang="en-US"/>
           </a:p>
@@ -3059,7 +3059,7 @@
             <a:fld id="{06197F35-AD6F-4594-8B50-334492D2E7E8}" type="datetime1">
               <a:rPr lang="zh-TW" altLang="en-US" smtClean="0"/>
               <a:pPr/>
-              <a:t>2018/12/13</a:t>
+              <a:t>2018/12/14</a:t>
             </a:fld>
             <a:endParaRPr lang="zh-TW" altLang="en-US"/>
           </a:p>
@@ -3462,7 +3462,7 @@
                   <a:srgbClr val="FFFF00"/>
                 </a:solidFill>
               </a:rPr>
-              <a:t>10 Access Internet</a:t>
+              <a:t>11 Parse XML</a:t>
             </a:r>
             <a:endParaRPr lang="zh-TW" altLang="en-US" sz="4800" b="1" dirty="0">
               <a:solidFill>
@@ -3520,7 +3520,7 @@
             <a:fld id="{C389EDC9-19E3-47AC-9C57-C6A24DEA81AD}" type="datetime1">
               <a:rPr lang="zh-TW" altLang="en-US" smtClean="0"/>
               <a:pPr/>
-              <a:t>2018/12/13</a:t>
+              <a:t>2018/12/14</a:t>
             </a:fld>
             <a:endParaRPr lang="zh-TW" altLang="en-US"/>
           </a:p>
@@ -3689,7 +3689,7 @@
             <a:fld id="{4E46BE27-E923-4EC2-B046-3272AE2A3E5C}" type="datetime1">
               <a:rPr lang="zh-TW" altLang="en-US" smtClean="0"/>
               <a:pPr/>
-              <a:t>2018/12/13</a:t>
+              <a:t>2018/12/14</a:t>
             </a:fld>
             <a:endParaRPr lang="zh-TW" altLang="en-US"/>
           </a:p>
@@ -3797,7 +3797,7 @@
                   <a:srgbClr val="FFFF00"/>
                 </a:solidFill>
               </a:rPr>
-              <a:t>10 Access Internet</a:t>
+              <a:t>11 Parse XML</a:t>
             </a:r>
             <a:endParaRPr lang="zh-TW" altLang="en-US" b="1" dirty="0">
               <a:solidFill>
@@ -4151,7 +4151,7 @@
             <a:fld id="{A4F910E6-8D00-4BAF-8C48-9688E0B449D3}" type="datetime1">
               <a:rPr lang="zh-TW" altLang="en-US" smtClean="0"/>
               <a:pPr/>
-              <a:t>2018/12/13</a:t>
+              <a:t>2018/12/14</a:t>
             </a:fld>
             <a:endParaRPr lang="zh-TW" altLang="en-US"/>
           </a:p>
@@ -4720,7 +4720,7 @@
                   <a:srgbClr val="FFFF00"/>
                 </a:solidFill>
               </a:rPr>
-              <a:t>10 Access Internet</a:t>
+              <a:t>11 Parse XML</a:t>
             </a:r>
             <a:endParaRPr lang="zh-TW" altLang="en-US" b="1" dirty="0">
               <a:solidFill>
@@ -4875,7 +4875,7 @@
             <a:fld id="{A4F910E6-8D00-4BAF-8C48-9688E0B449D3}" type="datetime1">
               <a:rPr lang="zh-TW" altLang="en-US" smtClean="0"/>
               <a:pPr/>
-              <a:t>2018/12/13</a:t>
+              <a:t>2018/12/14</a:t>
             </a:fld>
             <a:endParaRPr lang="zh-TW" altLang="en-US"/>
           </a:p>
@@ -5028,7 +5028,7 @@
                   <a:srgbClr val="FFFF00"/>
                 </a:solidFill>
               </a:rPr>
-              <a:t>10 Access Internet</a:t>
+              <a:t>11 Parse XML</a:t>
             </a:r>
             <a:endParaRPr lang="zh-TW" altLang="en-US" b="1" dirty="0">
               <a:solidFill>
@@ -5178,7 +5178,7 @@
             <a:fld id="{A4F910E6-8D00-4BAF-8C48-9688E0B449D3}" type="datetime1">
               <a:rPr lang="zh-TW" altLang="en-US" smtClean="0"/>
               <a:pPr/>
-              <a:t>2018/12/13</a:t>
+              <a:t>2018/12/14</a:t>
             </a:fld>
             <a:endParaRPr lang="zh-TW" altLang="en-US"/>
           </a:p>
@@ -5331,7 +5331,7 @@
                   <a:srgbClr val="FFFF00"/>
                 </a:solidFill>
               </a:rPr>
-              <a:t>10 Access Internet</a:t>
+              <a:t>11 Parse XML</a:t>
             </a:r>
             <a:endParaRPr lang="zh-TW" altLang="en-US" b="1" dirty="0">
               <a:solidFill>
@@ -5515,7 +5515,7 @@
             <a:fld id="{A4F910E6-8D00-4BAF-8C48-9688E0B449D3}" type="datetime1">
               <a:rPr lang="zh-TW" altLang="en-US" smtClean="0"/>
               <a:pPr/>
-              <a:t>2018/12/13</a:t>
+              <a:t>2018/12/14</a:t>
             </a:fld>
             <a:endParaRPr lang="zh-TW" altLang="en-US"/>
           </a:p>
@@ -5668,7 +5668,7 @@
                   <a:srgbClr val="FFFF00"/>
                 </a:solidFill>
               </a:rPr>
-              <a:t>10 Access Internet</a:t>
+              <a:t>11 Parse XML</a:t>
             </a:r>
             <a:endParaRPr lang="zh-TW" altLang="en-US" b="1" dirty="0">
               <a:solidFill>
@@ -5834,7 +5834,7 @@
             <a:fld id="{A4F910E6-8D00-4BAF-8C48-9688E0B449D3}" type="datetime1">
               <a:rPr lang="zh-TW" altLang="en-US" smtClean="0"/>
               <a:pPr/>
-              <a:t>2018/12/13</a:t>
+              <a:t>2018/12/14</a:t>
             </a:fld>
             <a:endParaRPr lang="zh-TW" altLang="en-US"/>
           </a:p>
@@ -6144,7 +6144,7 @@
                   <a:srgbClr val="FFFF00"/>
                 </a:solidFill>
               </a:rPr>
-              <a:t>10 Access Internet</a:t>
+              <a:t>11 Parse XML</a:t>
             </a:r>
             <a:endParaRPr lang="zh-TW" altLang="en-US" b="1" dirty="0">
               <a:solidFill>
@@ -6310,7 +6310,7 @@
             <a:fld id="{A4F910E6-8D00-4BAF-8C48-9688E0B449D3}" type="datetime1">
               <a:rPr lang="zh-TW" altLang="en-US" smtClean="0"/>
               <a:pPr/>
-              <a:t>2018/12/13</a:t>
+              <a:t>2018/12/14</a:t>
             </a:fld>
             <a:endParaRPr lang="zh-TW" altLang="en-US"/>
           </a:p>
@@ -6463,7 +6463,7 @@
                   <a:srgbClr val="FFFF00"/>
                 </a:solidFill>
               </a:rPr>
-              <a:t>10 Access Internet</a:t>
+              <a:t>11 Parse XML</a:t>
             </a:r>
             <a:endParaRPr lang="zh-TW" altLang="en-US" b="1" dirty="0">
               <a:solidFill>
@@ -6679,7 +6679,7 @@
             <a:fld id="{A4F910E6-8D00-4BAF-8C48-9688E0B449D3}" type="datetime1">
               <a:rPr lang="zh-TW" altLang="en-US" smtClean="0"/>
               <a:pPr/>
-              <a:t>2018/12/13</a:t>
+              <a:t>2018/12/14</a:t>
             </a:fld>
             <a:endParaRPr lang="zh-TW" altLang="en-US"/>
           </a:p>
@@ -6879,7 +6879,7 @@
                   <a:srgbClr val="FFFF00"/>
                 </a:solidFill>
               </a:rPr>
-              <a:t>10 Access Internet</a:t>
+              <a:t>11 Parse XML</a:t>
             </a:r>
             <a:endParaRPr lang="zh-TW" altLang="en-US" b="1" dirty="0">
               <a:solidFill>
@@ -7029,7 +7029,7 @@
             <a:fld id="{A4F910E6-8D00-4BAF-8C48-9688E0B449D3}" type="datetime1">
               <a:rPr lang="zh-TW" altLang="en-US" smtClean="0"/>
               <a:pPr/>
-              <a:t>2018/12/13</a:t>
+              <a:t>2018/12/14</a:t>
             </a:fld>
             <a:endParaRPr lang="zh-TW" altLang="en-US"/>
           </a:p>

</xml_diff>